<commit_message>
Final Update plus pdf for PPT
</commit_message>
<xml_diff>
--- a/Forecast Analysis and SQL Queries.pptx
+++ b/Forecast Analysis and SQL Queries.pptx
@@ -160,7 +160,7 @@
   <pc:docChgLst>
     <pc:chgData name="Mensah, Christiana O." userId="4978bce3-ba6e-4bed-a651-cc6d375a5f08" providerId="ADAL" clId="{AC0E6520-1127-4637-94EE-9466B23F8E87}"/>
     <pc:docChg chg="undo redo custSel addSld delSld modSld sldOrd">
-      <pc:chgData name="Mensah, Christiana O." userId="4978bce3-ba6e-4bed-a651-cc6d375a5f08" providerId="ADAL" clId="{AC0E6520-1127-4637-94EE-9466B23F8E87}" dt="2023-05-07T05:56:55.424" v="6741" actId="1076"/>
+      <pc:chgData name="Mensah, Christiana O." userId="4978bce3-ba6e-4bed-a651-cc6d375a5f08" providerId="ADAL" clId="{AC0E6520-1127-4637-94EE-9466B23F8E87}" dt="2023-05-07T06:51:57.077" v="6762" actId="20577"/>
       <pc:docMkLst>
         <pc:docMk/>
       </pc:docMkLst>
@@ -689,7 +689,7 @@
         </pc:picChg>
       </pc:sldChg>
       <pc:sldChg chg="addSp delSp modSp mod setBg">
-        <pc:chgData name="Mensah, Christiana O." userId="4978bce3-ba6e-4bed-a651-cc6d375a5f08" providerId="ADAL" clId="{AC0E6520-1127-4637-94EE-9466B23F8E87}" dt="2023-05-07T00:26:14.750" v="1877" actId="255"/>
+        <pc:chgData name="Mensah, Christiana O." userId="4978bce3-ba6e-4bed-a651-cc6d375a5f08" providerId="ADAL" clId="{AC0E6520-1127-4637-94EE-9466B23F8E87}" dt="2023-05-07T06:10:36.372" v="6756" actId="207"/>
         <pc:sldMkLst>
           <pc:docMk/>
           <pc:sldMk cId="2496947791" sldId="278"/>
@@ -759,7 +759,7 @@
           </ac:spMkLst>
         </pc:spChg>
         <pc:spChg chg="add mod ord">
-          <ac:chgData name="Mensah, Christiana O." userId="4978bce3-ba6e-4bed-a651-cc6d375a5f08" providerId="ADAL" clId="{AC0E6520-1127-4637-94EE-9466B23F8E87}" dt="2023-05-07T00:26:14.750" v="1877" actId="255"/>
+          <ac:chgData name="Mensah, Christiana O." userId="4978bce3-ba6e-4bed-a651-cc6d375a5f08" providerId="ADAL" clId="{AC0E6520-1127-4637-94EE-9466B23F8E87}" dt="2023-05-07T06:10:36.372" v="6756" actId="207"/>
           <ac:spMkLst>
             <pc:docMk/>
             <pc:sldMk cId="2496947791" sldId="278"/>
@@ -942,7 +942,7 @@
         </pc:sldMkLst>
       </pc:sldChg>
       <pc:sldChg chg="addSp delSp modSp mod">
-        <pc:chgData name="Mensah, Christiana O." userId="4978bce3-ba6e-4bed-a651-cc6d375a5f08" providerId="ADAL" clId="{AC0E6520-1127-4637-94EE-9466B23F8E87}" dt="2023-05-07T05:56:55.424" v="6741" actId="1076"/>
+        <pc:chgData name="Mensah, Christiana O." userId="4978bce3-ba6e-4bed-a651-cc6d375a5f08" providerId="ADAL" clId="{AC0E6520-1127-4637-94EE-9466B23F8E87}" dt="2023-05-07T06:08:30.043" v="6750" actId="6549"/>
         <pc:sldMkLst>
           <pc:docMk/>
           <pc:sldMk cId="560021826" sldId="317"/>
@@ -956,7 +956,7 @@
           </ac:spMkLst>
         </pc:spChg>
         <pc:spChg chg="add mod ord">
-          <ac:chgData name="Mensah, Christiana O." userId="4978bce3-ba6e-4bed-a651-cc6d375a5f08" providerId="ADAL" clId="{AC0E6520-1127-4637-94EE-9466B23F8E87}" dt="2023-05-07T05:56:26.422" v="6737" actId="167"/>
+          <ac:chgData name="Mensah, Christiana O." userId="4978bce3-ba6e-4bed-a651-cc6d375a5f08" providerId="ADAL" clId="{AC0E6520-1127-4637-94EE-9466B23F8E87}" dt="2023-05-07T06:08:30.043" v="6750" actId="6549"/>
           <ac:spMkLst>
             <pc:docMk/>
             <pc:sldMk cId="560021826" sldId="317"/>
@@ -1020,7 +1020,7 @@
         </pc:spChg>
       </pc:sldChg>
       <pc:sldChg chg="addSp delSp modSp mod">
-        <pc:chgData name="Mensah, Christiana O." userId="4978bce3-ba6e-4bed-a651-cc6d375a5f08" providerId="ADAL" clId="{AC0E6520-1127-4637-94EE-9466B23F8E87}" dt="2023-05-07T05:47:24.303" v="6304" actId="20577"/>
+        <pc:chgData name="Mensah, Christiana O." userId="4978bce3-ba6e-4bed-a651-cc6d375a5f08" providerId="ADAL" clId="{AC0E6520-1127-4637-94EE-9466B23F8E87}" dt="2023-05-07T06:07:13.486" v="6742" actId="33524"/>
         <pc:sldMkLst>
           <pc:docMk/>
           <pc:sldMk cId="2158886557" sldId="384"/>
@@ -1034,7 +1034,7 @@
           </ac:spMkLst>
         </pc:spChg>
         <pc:spChg chg="mod">
-          <ac:chgData name="Mensah, Christiana O." userId="4978bce3-ba6e-4bed-a651-cc6d375a5f08" providerId="ADAL" clId="{AC0E6520-1127-4637-94EE-9466B23F8E87}" dt="2023-05-06T04:01:27.847" v="233" actId="27636"/>
+          <ac:chgData name="Mensah, Christiana O." userId="4978bce3-ba6e-4bed-a651-cc6d375a5f08" providerId="ADAL" clId="{AC0E6520-1127-4637-94EE-9466B23F8E87}" dt="2023-05-07T06:07:13.486" v="6742" actId="33524"/>
           <ac:spMkLst>
             <pc:docMk/>
             <pc:sldMk cId="2158886557" sldId="384"/>
@@ -1414,7 +1414,7 @@
         </pc:spChg>
       </pc:sldChg>
       <pc:sldChg chg="addSp delSp modSp new mod">
-        <pc:chgData name="Mensah, Christiana O." userId="4978bce3-ba6e-4bed-a651-cc6d375a5f08" providerId="ADAL" clId="{AC0E6520-1127-4637-94EE-9466B23F8E87}" dt="2023-05-07T05:17:21.527" v="4971" actId="20577"/>
+        <pc:chgData name="Mensah, Christiana O." userId="4978bce3-ba6e-4bed-a651-cc6d375a5f08" providerId="ADAL" clId="{AC0E6520-1127-4637-94EE-9466B23F8E87}" dt="2023-05-07T06:51:57.077" v="6762" actId="20577"/>
         <pc:sldMkLst>
           <pc:docMk/>
           <pc:sldMk cId="310681392" sldId="395"/>
@@ -1460,7 +1460,7 @@
           </ac:spMkLst>
         </pc:spChg>
         <pc:spChg chg="add mod">
-          <ac:chgData name="Mensah, Christiana O." userId="4978bce3-ba6e-4bed-a651-cc6d375a5f08" providerId="ADAL" clId="{AC0E6520-1127-4637-94EE-9466B23F8E87}" dt="2023-05-07T05:16:51.563" v="4966" actId="1076"/>
+          <ac:chgData name="Mensah, Christiana O." userId="4978bce3-ba6e-4bed-a651-cc6d375a5f08" providerId="ADAL" clId="{AC0E6520-1127-4637-94EE-9466B23F8E87}" dt="2023-05-07T06:51:45.345" v="6759" actId="14100"/>
           <ac:spMkLst>
             <pc:docMk/>
             <pc:sldMk cId="310681392" sldId="395"/>
@@ -1468,7 +1468,7 @@
           </ac:spMkLst>
         </pc:spChg>
         <pc:spChg chg="add mod">
-          <ac:chgData name="Mensah, Christiana O." userId="4978bce3-ba6e-4bed-a651-cc6d375a5f08" providerId="ADAL" clId="{AC0E6520-1127-4637-94EE-9466B23F8E87}" dt="2023-05-07T05:17:21.527" v="4971" actId="20577"/>
+          <ac:chgData name="Mensah, Christiana O." userId="4978bce3-ba6e-4bed-a651-cc6d375a5f08" providerId="ADAL" clId="{AC0E6520-1127-4637-94EE-9466B23F8E87}" dt="2023-05-07T06:51:57.077" v="6762" actId="20577"/>
           <ac:spMkLst>
             <pc:docMk/>
             <pc:sldMk cId="310681392" sldId="395"/>
@@ -1485,13 +1485,13 @@
         </pc:graphicFrameChg>
       </pc:sldChg>
       <pc:sldChg chg="modSp add mod">
-        <pc:chgData name="Mensah, Christiana O." userId="4978bce3-ba6e-4bed-a651-cc6d375a5f08" providerId="ADAL" clId="{AC0E6520-1127-4637-94EE-9466B23F8E87}" dt="2023-05-07T05:37:22.239" v="5823" actId="20577"/>
+        <pc:chgData name="Mensah, Christiana O." userId="4978bce3-ba6e-4bed-a651-cc6d375a5f08" providerId="ADAL" clId="{AC0E6520-1127-4637-94EE-9466B23F8E87}" dt="2023-05-07T06:11:17.928" v="6758" actId="1076"/>
         <pc:sldMkLst>
           <pc:docMk/>
           <pc:sldMk cId="2000215788" sldId="396"/>
         </pc:sldMkLst>
         <pc:spChg chg="mod">
-          <ac:chgData name="Mensah, Christiana O." userId="4978bce3-ba6e-4bed-a651-cc6d375a5f08" providerId="ADAL" clId="{AC0E6520-1127-4637-94EE-9466B23F8E87}" dt="2023-05-07T05:34:25.847" v="5736" actId="20577"/>
+          <ac:chgData name="Mensah, Christiana O." userId="4978bce3-ba6e-4bed-a651-cc6d375a5f08" providerId="ADAL" clId="{AC0E6520-1127-4637-94EE-9466B23F8E87}" dt="2023-05-07T06:11:17.928" v="6758" actId="1076"/>
           <ac:spMkLst>
             <pc:docMk/>
             <pc:sldMk cId="2000215788" sldId="396"/>
@@ -17287,8 +17287,8 @@
         </p:nvSpPr>
         <p:spPr>
           <a:xfrm>
-            <a:off x="5820878" y="421025"/>
-            <a:ext cx="5820258" cy="2816156"/>
+            <a:off x="5150069" y="421025"/>
+            <a:ext cx="6491067" cy="2539157"/>
           </a:xfrm>
           <a:prstGeom prst="rect">
             <a:avLst/>
@@ -17507,8 +17507,8 @@
         </p:nvSpPr>
         <p:spPr>
           <a:xfrm>
-            <a:off x="5150069" y="3237181"/>
-            <a:ext cx="6734725" cy="3970318"/>
+            <a:off x="5150069" y="3121567"/>
+            <a:ext cx="6734725" cy="3693319"/>
           </a:xfrm>
           <a:prstGeom prst="rect">
             <a:avLst/>
@@ -17552,12 +17552,6 @@
               <a:rPr lang="en-US" dirty="0"/>
               <a:t>I did a subquery where am selecting the region and customers from the subquery that has each customers appearing in more than one region. The resulting display will have the only customers by ID that exist in multiple regions.</a:t>
             </a:r>
-          </a:p>
-          <a:p>
-            <a:pPr marL="342900" indent="-342900">
-              <a:buAutoNum type="alphaUcParenR"/>
-            </a:pPr>
-            <a:endParaRPr lang="en-US" dirty="0"/>
           </a:p>
         </p:txBody>
       </p:sp>
@@ -17642,7 +17636,7 @@
         </p:nvSpPr>
         <p:spPr>
           <a:xfrm>
-            <a:off x="551499" y="3321270"/>
+            <a:off x="550863" y="3639152"/>
             <a:ext cx="3565525" cy="3037244"/>
           </a:xfrm>
         </p:spPr>
@@ -19387,13 +19381,8 @@
             </a:pPr>
             <a:r>
               <a:rPr lang="en-US" dirty="0"/>
-              <a:t>Understanding the number of days traffic flows or how often it does on a site, helps to plan for marketing, logistics and other important actions such as IT maintenance or </a:t>
-            </a:r>
-            <a:r>
-              <a:rPr lang="en-US"/>
-              <a:t>site refresh. </a:t>
-            </a:r>
-            <a:endParaRPr lang="en-US" dirty="0"/>
+              <a:t>Understanding the number of days traffic flows or how often it does on a site, helps to plan for marketing, logistics and other important actions such as IT maintenance or site refresh. </a:t>
+            </a:r>
           </a:p>
         </p:txBody>
       </p:sp>
@@ -20337,7 +20326,7 @@
           <a:p>
             <a:r>
               <a:rPr lang="en-US" dirty="0"/>
-              <a:t>Part 1: Visualize this data and include any insights about the business that you inferred based on sales trends. (E.g. When do sales spike? What do you think that suggests about the nature of the business?)</a:t>
+              <a:t>Part 1: Visualize this data and include any insights about the business that you inferred based on sales trends. (E.g., When do sales spike? What do you think that suggests about the nature of the business?)</a:t>
             </a:r>
           </a:p>
           <a:p>
@@ -21878,7 +21867,7 @@
             </a:r>
             <a:r>
               <a:rPr lang="en-US" dirty="0"/>
-              <a:t> noter .</a:t>
+              <a:t> notebook.</a:t>
             </a:r>
           </a:p>
           <a:p>
@@ -22937,12 +22926,12 @@
         <p:spPr>
           <a:xfrm>
             <a:off x="6800193" y="735724"/>
-            <a:ext cx="4840943" cy="4588353"/>
+            <a:ext cx="4840943" cy="5265228"/>
           </a:xfrm>
         </p:spPr>
         <p:txBody>
           <a:bodyPr anchor="t">
-            <a:normAutofit fontScale="25000" lnSpcReduction="20000"/>
+            <a:normAutofit fontScale="92500" lnSpcReduction="20000"/>
           </a:bodyPr>
           <a:lstStyle/>
           <a:p>
@@ -22958,11 +22947,13 @@
               </a:spcAft>
             </a:pPr>
             <a:r>
-              <a:rPr lang="en-US" sz="6400" dirty="0">
+              <a:rPr lang="en-US" sz="1800" dirty="0">
                 <a:solidFill>
-                  <a:schemeClr val="tx1"/>
+                  <a:schemeClr val="tx1">
+                    <a:lumMod val="95000"/>
+                  </a:schemeClr>
                 </a:solidFill>
-                <a:latin typeface="Avenir Next LT Pro" panose="020B0504020202020204" pitchFamily="34" charset="0"/>
+                <a:latin typeface="Gill Sans MT" panose="020B0502020104020203" pitchFamily="34" charset="0"/>
               </a:rPr>
               <a:t>In an Autocorrelation graph, there is a trend when the autocorrelation tends to be high at small lags like 1 or 2 and when seasonality exists, the autocorrelation goes up periodically at larger lags like we see at lag 12.  </a:t>
             </a:r>
@@ -22980,11 +22971,13 @@
               </a:spcAft>
             </a:pPr>
             <a:r>
-              <a:rPr lang="en-US" sz="6400" dirty="0">
+              <a:rPr lang="en-US" sz="1800" dirty="0">
                 <a:solidFill>
-                  <a:schemeClr val="tx1"/>
+                  <a:schemeClr val="tx1">
+                    <a:lumMod val="95000"/>
+                  </a:schemeClr>
                 </a:solidFill>
-                <a:latin typeface="Avenir Next LT Pro" panose="020B0504020202020204" pitchFamily="34" charset="0"/>
+                <a:latin typeface="Gill Sans MT" panose="020B0502020104020203" pitchFamily="34" charset="0"/>
               </a:rPr>
               <a:t>In this graph we see a trend but  because there is only one spike which is also below the 0.50 line shows little significance, there is a likelihood  that seasonality does not exist. </a:t>
             </a:r>
@@ -23002,11 +22995,13 @@
               </a:spcAft>
             </a:pPr>
             <a:r>
-              <a:rPr lang="en-US" sz="6400" dirty="0">
+              <a:rPr lang="en-US" sz="1800" dirty="0">
                 <a:solidFill>
-                  <a:schemeClr val="tx1"/>
+                  <a:schemeClr val="tx1">
+                    <a:lumMod val="95000"/>
+                  </a:schemeClr>
                 </a:solidFill>
-                <a:latin typeface="Avenir Next LT Pro" panose="020B0504020202020204" pitchFamily="34" charset="0"/>
+                <a:latin typeface="Gill Sans MT" panose="020B0502020104020203" pitchFamily="34" charset="0"/>
               </a:rPr>
               <a:t>We also see a deep in from January to February and a slow rise in sales up until August and then there is a fluctuation and a sharp rise from October to November, then a sharp drop in December and finally slow  progression in January.  </a:t>
             </a:r>
@@ -23024,11 +23019,13 @@
               </a:spcAft>
             </a:pPr>
             <a:r>
-              <a:rPr lang="en-US" sz="6400" dirty="0">
+              <a:rPr lang="en-US" sz="1800" dirty="0">
                 <a:solidFill>
-                  <a:schemeClr val="tx1"/>
+                  <a:schemeClr val="tx1">
+                    <a:lumMod val="95000"/>
+                  </a:schemeClr>
                 </a:solidFill>
-                <a:latin typeface="Avenir Next LT Pro" panose="020B0504020202020204" pitchFamily="34" charset="0"/>
+                <a:latin typeface="Gill Sans MT" panose="020B0502020104020203" pitchFamily="34" charset="0"/>
               </a:rPr>
               <a:t>The fact that this pattern repeats in the following year suggests a trend. </a:t>
             </a:r>
@@ -23046,47 +23043,57 @@
               </a:spcAft>
             </a:pPr>
             <a:r>
-              <a:rPr lang="en-US" sz="6400" dirty="0">
+              <a:rPr lang="en-US" sz="1800" dirty="0">
                 <a:solidFill>
-                  <a:schemeClr val="tx1"/>
+                  <a:schemeClr val="tx1">
+                    <a:lumMod val="95000"/>
+                  </a:schemeClr>
                 </a:solidFill>
-                <a:latin typeface="Avenir Next LT Pro" panose="020B0504020202020204" pitchFamily="34" charset="0"/>
+                <a:latin typeface="Gill Sans MT" panose="020B0502020104020203" pitchFamily="34" charset="0"/>
               </a:rPr>
               <a:t>The sharp rise in </a:t>
             </a:r>
             <a:r>
-              <a:rPr lang="en-US" sz="6400" b="1" dirty="0">
+              <a:rPr lang="en-US" sz="1800" b="1" dirty="0">
                 <a:solidFill>
-                  <a:schemeClr val="tx1"/>
+                  <a:schemeClr val="tx1">
+                    <a:lumMod val="95000"/>
+                  </a:schemeClr>
                 </a:solidFill>
-                <a:latin typeface="Avenir Next LT Pro" panose="020B0504020202020204" pitchFamily="34" charset="0"/>
+                <a:latin typeface="Gill Sans MT" panose="020B0502020104020203" pitchFamily="34" charset="0"/>
               </a:rPr>
               <a:t>October</a:t>
             </a:r>
             <a:r>
-              <a:rPr lang="en-US" sz="6400" dirty="0">
+              <a:rPr lang="en-US" sz="1800" dirty="0">
                 <a:solidFill>
-                  <a:schemeClr val="tx1"/>
+                  <a:schemeClr val="tx1">
+                    <a:lumMod val="95000"/>
+                  </a:schemeClr>
                 </a:solidFill>
-                <a:latin typeface="Avenir Next LT Pro" panose="020B0504020202020204" pitchFamily="34" charset="0"/>
+                <a:latin typeface="Gill Sans MT" panose="020B0502020104020203" pitchFamily="34" charset="0"/>
               </a:rPr>
               <a:t> sales may also suggest that this store sells </a:t>
             </a:r>
             <a:r>
-              <a:rPr lang="en-US" sz="6400" b="1" dirty="0">
+              <a:rPr lang="en-US" sz="1800" b="1" dirty="0">
                 <a:solidFill>
-                  <a:schemeClr val="tx1"/>
+                  <a:schemeClr val="tx1">
+                    <a:lumMod val="95000"/>
+                  </a:schemeClr>
                 </a:solidFill>
-                <a:latin typeface="Avenir Next LT Pro" panose="020B0504020202020204" pitchFamily="34" charset="0"/>
+                <a:latin typeface="Gill Sans MT" panose="020B0502020104020203" pitchFamily="34" charset="0"/>
               </a:rPr>
               <a:t>Halloween products or costumes </a:t>
             </a:r>
             <a:r>
-              <a:rPr lang="en-US" sz="6400" dirty="0">
+              <a:rPr lang="en-US" sz="1800" dirty="0">
                 <a:solidFill>
-                  <a:schemeClr val="tx1"/>
+                  <a:schemeClr val="tx1">
+                    <a:lumMod val="95000"/>
+                  </a:schemeClr>
                 </a:solidFill>
-                <a:latin typeface="Avenir Next LT Pro" panose="020B0504020202020204" pitchFamily="34" charset="0"/>
+                <a:latin typeface="Gill Sans MT" panose="020B0502020104020203" pitchFamily="34" charset="0"/>
               </a:rPr>
               <a:t>and right after we get into the thanksgiving and Christmas season where those products are out of season the sales drop significantly. </a:t>
             </a:r>
@@ -23104,7 +23111,7 @@
               </a:spcAft>
               <a:buNone/>
             </a:pPr>
-            <a:endParaRPr lang="en-US" sz="1900" dirty="0"/>
+            <a:endParaRPr lang="en-US" sz="700" dirty="0"/>
           </a:p>
         </p:txBody>
       </p:sp>
@@ -23359,7 +23366,7 @@
               </a:spcAft>
             </a:pPr>
             <a:r>
-              <a:rPr lang="en-US"/>
+              <a:rPr lang="en-US" dirty="0"/>
               <a:t>Christiana Mensah</a:t>
             </a:r>
           </a:p>
@@ -27577,15 +27584,6 @@
 </file>
 
 <file path=customXml/item1.xml><?xml version="1.0" encoding="utf-8"?>
-<?mso-contentType ?>
-<FormTemplates xmlns="http://schemas.microsoft.com/sharepoint/v3/contenttype/forms">
-  <Display>DocumentLibraryForm</Display>
-  <Edit>DocumentLibraryForm</Edit>
-  <New>DocumentLibraryForm</New>
-</FormTemplates>
-</file>
-
-<file path=customXml/item2.xml><?xml version="1.0" encoding="utf-8"?>
 <ct:contentTypeSchema xmlns:ct="http://schemas.microsoft.com/office/2006/metadata/contentType" xmlns:ma="http://schemas.microsoft.com/office/2006/metadata/properties/metaAttributes" ct:_="" ma:_="" ma:contentTypeName="Document" ma:contentTypeID="0x01010079F111ED35F8CC479449609E8A0923A6" ma:contentTypeVersion="18" ma:contentTypeDescription="Create a new document." ma:contentTypeScope="" ma:versionID="22a266b9fa9a230c5a512669d8b298c3">
   <xsd:schema xmlns:xsd="http://www.w3.org/2001/XMLSchema" xmlns:xs="http://www.w3.org/2001/XMLSchema" xmlns:p="http://schemas.microsoft.com/office/2006/metadata/properties" xmlns:ns1="http://schemas.microsoft.com/sharepoint/v3" xmlns:ns2="71af3243-3dd4-4a8d-8c0d-dd76da1f02a5" xmlns:ns3="16c05727-aa75-4e4a-9b5f-8a80a1165891" xmlns:ns4="230e9df3-be65-4c73-a93b-d1236ebd677e" targetNamespace="http://schemas.microsoft.com/office/2006/metadata/properties" ma:root="true" ma:fieldsID="eddc33fff6b14141ee5c74a0d29ea6a1" ns1:_="" ns2:_="" ns3:_="" ns4:_="">
     <xsd:import namespace="http://schemas.microsoft.com/sharepoint/v3"/>
@@ -27861,6 +27859,15 @@
 </ct:contentTypeSchema>
 </file>
 
+<file path=customXml/item2.xml><?xml version="1.0" encoding="utf-8"?>
+<?mso-contentType ?>
+<FormTemplates xmlns="http://schemas.microsoft.com/sharepoint/v3/contenttype/forms">
+  <Display>DocumentLibraryForm</Display>
+  <Edit>DocumentLibraryForm</Edit>
+  <New>DocumentLibraryForm</New>
+</FormTemplates>
+</file>
+
 <file path=customXml/item3.xml><?xml version="1.0" encoding="utf-8"?>
 <p:properties xmlns:p="http://schemas.microsoft.com/office/2006/metadata/properties" xmlns:xsi="http://www.w3.org/2001/XMLSchema-instance" xmlns:pc="http://schemas.microsoft.com/office/infopath/2007/PartnerControls">
   <documentManagement>
@@ -27881,14 +27888,6 @@
 </file>
 
 <file path=customXml/itemProps1.xml><?xml version="1.0" encoding="utf-8"?>
-<ds:datastoreItem xmlns:ds="http://schemas.openxmlformats.org/officeDocument/2006/customXml" ds:itemID="{904751AB-E840-446F-8D49-E697067EC887}">
-  <ds:schemaRefs>
-    <ds:schemaRef ds:uri="http://schemas.microsoft.com/sharepoint/v3/contenttype/forms"/>
-  </ds:schemaRefs>
-</ds:datastoreItem>
-</file>
-
-<file path=customXml/itemProps2.xml><?xml version="1.0" encoding="utf-8"?>
 <ds:datastoreItem xmlns:ds="http://schemas.openxmlformats.org/officeDocument/2006/customXml" ds:itemID="{DE4876F9-7AE1-498D-B8FE-1E3AD703D2AF}">
   <ds:schemaRefs>
     <ds:schemaRef ds:uri="http://schemas.microsoft.com/office/2006/metadata/contentType"/>
@@ -27909,21 +27908,29 @@
 </ds:datastoreItem>
 </file>
 
+<file path=customXml/itemProps2.xml><?xml version="1.0" encoding="utf-8"?>
+<ds:datastoreItem xmlns:ds="http://schemas.openxmlformats.org/officeDocument/2006/customXml" ds:itemID="{904751AB-E840-446F-8D49-E697067EC887}">
+  <ds:schemaRefs>
+    <ds:schemaRef ds:uri="http://schemas.microsoft.com/sharepoint/v3/contenttype/forms"/>
+  </ds:schemaRefs>
+</ds:datastoreItem>
+</file>
+
 <file path=customXml/itemProps3.xml><?xml version="1.0" encoding="utf-8"?>
 <ds:datastoreItem xmlns:ds="http://schemas.openxmlformats.org/officeDocument/2006/customXml" ds:itemID="{50811A92-D464-4AC4-A396-BA73B10CEEAC}">
   <ds:schemaRefs>
+    <ds:schemaRef ds:uri="http://schemas.microsoft.com/office/2006/documentManagement/types"/>
+    <ds:schemaRef ds:uri="http://purl.org/dc/terms/"/>
+    <ds:schemaRef ds:uri="http://schemas.microsoft.com/sharepoint/v3"/>
+    <ds:schemaRef ds:uri="16c05727-aa75-4e4a-9b5f-8a80a1165891"/>
+    <ds:schemaRef ds:uri="http://purl.org/dc/elements/1.1/"/>
     <ds:schemaRef ds:uri="http://schemas.microsoft.com/office/infopath/2007/PartnerControls"/>
     <ds:schemaRef ds:uri="http://schemas.openxmlformats.org/package/2006/metadata/core-properties"/>
-    <ds:schemaRef ds:uri="http://purl.org/dc/elements/1.1/"/>
-    <ds:schemaRef ds:uri="16c05727-aa75-4e4a-9b5f-8a80a1165891"/>
-    <ds:schemaRef ds:uri="http://schemas.microsoft.com/sharepoint/v3"/>
-    <ds:schemaRef ds:uri="http://purl.org/dc/terms/"/>
-    <ds:schemaRef ds:uri="http://schemas.microsoft.com/office/2006/documentManagement/types"/>
     <ds:schemaRef ds:uri="http://schemas.microsoft.com/office/2006/metadata/properties"/>
     <ds:schemaRef ds:uri="http://purl.org/dc/dcmitype/"/>
-    <ds:schemaRef ds:uri="http://www.w3.org/XML/1998/namespace"/>
     <ds:schemaRef ds:uri="230e9df3-be65-4c73-a93b-d1236ebd677e"/>
     <ds:schemaRef ds:uri="71af3243-3dd4-4a8d-8c0d-dd76da1f02a5"/>
+    <ds:schemaRef ds:uri="http://www.w3.org/XML/1998/namespace"/>
   </ds:schemaRefs>
 </ds:datastoreItem>
 </file>

</xml_diff>